<commit_message>
publish slides for 2018 spring semester
</commit_message>
<xml_diff>
--- a/lec01-patent_intro.pptx
+++ b/lec01-patent_intro.pptx
@@ -7329,83 +7329,126 @@
           <a:lstStyle/>
           <a:p>
             <a:r>
-              <a:rPr lang="en-US" altLang="zh-TW" dirty="0" smtClean="0"/>
+              <a:rPr lang="en-US" altLang="zh-TW" sz="2400" dirty="0" smtClean="0"/>
               <a:t>2017/02</a:t>
             </a:r>
             <a:r>
-              <a:rPr lang="zh-TW" altLang="en-US" dirty="0" smtClean="0"/>
+              <a:rPr lang="zh-TW" altLang="en-US" sz="2400" dirty="0" smtClean="0"/>
               <a:t>，</a:t>
             </a:r>
             <a:r>
-              <a:rPr lang="en-US" altLang="zh-TW" dirty="0" smtClean="0"/>
+              <a:rPr lang="en-US" altLang="zh-TW" sz="2400" dirty="0" smtClean="0"/>
               <a:t>AMD </a:t>
             </a:r>
             <a:r>
-              <a:rPr lang="zh-TW" altLang="en-US" dirty="0" smtClean="0"/>
+              <a:rPr lang="zh-TW" altLang="en-US" sz="2400" dirty="0" smtClean="0"/>
               <a:t>控告聯發科等四家手機晶片商侵犯其 </a:t>
             </a:r>
             <a:r>
-              <a:rPr lang="en-US" altLang="zh-TW" dirty="0" smtClean="0"/>
+              <a:rPr lang="en-US" altLang="zh-TW" sz="2400" dirty="0" smtClean="0"/>
               <a:t>GPU (Graphics Processing Unit) </a:t>
             </a:r>
             <a:r>
-              <a:rPr lang="zh-TW" altLang="en-US" dirty="0" smtClean="0"/>
+              <a:rPr lang="zh-TW" altLang="en-US" sz="2400" dirty="0" smtClean="0"/>
               <a:t>相關專利。</a:t>
             </a:r>
-            <a:endParaRPr lang="en-US" altLang="zh-TW" dirty="0" smtClean="0"/>
-          </a:p>
-          <a:p>
-            <a:r>
-              <a:rPr lang="zh-TW" altLang="en-US" dirty="0" smtClean="0"/>
+            <a:endParaRPr lang="en-US" altLang="zh-TW" sz="2400" dirty="0" smtClean="0"/>
+          </a:p>
+          <a:p>
+            <a:r>
+              <a:rPr lang="zh-TW" altLang="en-US" sz="2400" dirty="0" smtClean="0"/>
               <a:t>聯發科等晶片廠商並非自行開發 </a:t>
             </a:r>
             <a:r>
-              <a:rPr lang="en-US" altLang="zh-TW" dirty="0" smtClean="0"/>
+              <a:rPr lang="en-US" altLang="zh-TW" sz="2400" dirty="0" smtClean="0"/>
               <a:t>GPU</a:t>
             </a:r>
             <a:r>
-              <a:rPr lang="zh-TW" altLang="en-US" dirty="0" smtClean="0"/>
+              <a:rPr lang="zh-TW" altLang="en-US" sz="2400" dirty="0" smtClean="0"/>
               <a:t>，而是向 </a:t>
             </a:r>
             <a:r>
-              <a:rPr lang="en-US" altLang="zh-TW" dirty="0" smtClean="0"/>
+              <a:rPr lang="en-US" altLang="zh-TW" sz="2400" dirty="0" smtClean="0"/>
               <a:t>ARM </a:t>
             </a:r>
             <a:r>
-              <a:rPr lang="zh-TW" altLang="en-US" dirty="0" smtClean="0"/>
+              <a:rPr lang="zh-TW" altLang="en-US" sz="2400" dirty="0" smtClean="0"/>
               <a:t>購買 </a:t>
             </a:r>
             <a:r>
-              <a:rPr lang="en-US" altLang="zh-TW" dirty="0" smtClean="0"/>
+              <a:rPr lang="en-US" altLang="zh-TW" sz="2400" dirty="0" smtClean="0"/>
               <a:t>GPU </a:t>
             </a:r>
             <a:r>
-              <a:rPr lang="zh-TW" altLang="en-US" dirty="0" smtClean="0"/>
+              <a:rPr lang="zh-TW" altLang="en-US" sz="2400" dirty="0" smtClean="0"/>
               <a:t>核心。</a:t>
             </a:r>
-            <a:endParaRPr lang="en-US" altLang="zh-TW" dirty="0"/>
-          </a:p>
-          <a:p>
-            <a:r>
-              <a:rPr lang="en-US" altLang="zh-TW" dirty="0">
+            <a:endParaRPr lang="en-US" altLang="zh-TW" sz="2400" dirty="0"/>
+          </a:p>
+          <a:p>
+            <a:r>
+              <a:rPr lang="en-US" altLang="zh-TW" sz="2400" dirty="0">
                 <a:hlinkClick r:id="rId2"/>
               </a:rPr>
               <a:t>https://</a:t>
             </a:r>
             <a:r>
-              <a:rPr lang="en-US" altLang="zh-TW" dirty="0" smtClean="0">
+              <a:rPr lang="en-US" altLang="zh-TW" sz="2400" dirty="0" smtClean="0">
                 <a:hlinkClick r:id="rId2"/>
               </a:rPr>
               <a:t>www.anandtech.com/show/11101/amd-files-patent-complaint-against-mediatek-lg-vizio</a:t>
             </a:r>
             <a:r>
-              <a:rPr lang="en-US" altLang="zh-TW" dirty="0" smtClean="0"/>
+              <a:rPr lang="en-US" altLang="zh-TW" sz="2400" dirty="0" smtClean="0"/>
               <a:t> </a:t>
             </a:r>
-            <a:endParaRPr lang="en-US" altLang="zh-TW" dirty="0"/>
-          </a:p>
-          <a:p>
-            <a:endParaRPr lang="zh-TW" altLang="en-US" dirty="0"/>
+            <a:endParaRPr lang="en-US" altLang="zh-TW" sz="2400" dirty="0"/>
+          </a:p>
+          <a:p>
+            <a:r>
+              <a:rPr lang="zh-TW" altLang="en-US" sz="2400" dirty="0" smtClean="0"/>
+              <a:t>初步判決： </a:t>
+            </a:r>
+            <a:r>
+              <a:rPr lang="en-US" altLang="zh-TW" sz="2400" dirty="0" smtClean="0">
+                <a:solidFill>
+                  <a:srgbClr val="FF0000"/>
+                </a:solidFill>
+              </a:rPr>
+              <a:t>AMD </a:t>
+            </a:r>
+            <a:r>
+              <a:rPr lang="zh-TW" altLang="en-US" sz="2400" dirty="0" smtClean="0">
+                <a:solidFill>
+                  <a:srgbClr val="FF0000"/>
+                </a:solidFill>
+              </a:rPr>
+              <a:t>勝訴</a:t>
+            </a:r>
+            <a:endParaRPr lang="en-US" altLang="zh-TW" sz="2400" dirty="0" smtClean="0">
+              <a:solidFill>
+                <a:srgbClr val="FF0000"/>
+              </a:solidFill>
+            </a:endParaRPr>
+          </a:p>
+          <a:p>
+            <a:r>
+              <a:rPr lang="en-US" altLang="zh-TW" sz="2400" dirty="0">
+                <a:hlinkClick r:id="rId3"/>
+              </a:rPr>
+              <a:t>https://</a:t>
+            </a:r>
+            <a:r>
+              <a:rPr lang="en-US" altLang="zh-TW" sz="2400" dirty="0" smtClean="0">
+                <a:hlinkClick r:id="rId3"/>
+              </a:rPr>
+              <a:t>www.anandtech.com/show/13272/amd-wins-patent-infringement-order-against-vizio</a:t>
+            </a:r>
+            <a:r>
+              <a:rPr lang="en-US" altLang="zh-TW" sz="2400" dirty="0" smtClean="0"/>
+              <a:t> </a:t>
+            </a:r>
+            <a:endParaRPr lang="zh-TW" altLang="en-US" sz="2400" dirty="0"/>
           </a:p>
         </p:txBody>
       </p:sp>
@@ -7774,7 +7817,7 @@
             <a:pPr eaLnBrk="1" hangingPunct="1"/>
             <a:r>
               <a:rPr lang="en-US" altLang="zh-TW" dirty="0" smtClean="0"/>
-              <a:t>3/14: </a:t>
+              <a:t>9/25: </a:t>
             </a:r>
             <a:r>
               <a:rPr lang="zh-TW" altLang="en-US" dirty="0" smtClean="0"/>
@@ -7785,7 +7828,7 @@
             <a:pPr eaLnBrk="1" hangingPunct="1"/>
             <a:r>
               <a:rPr lang="en-US" altLang="zh-TW" dirty="0" smtClean="0"/>
-              <a:t>3/21: </a:t>
+              <a:t>10/02: </a:t>
             </a:r>
             <a:r>
               <a:rPr lang="zh-TW" altLang="en-US" dirty="0" smtClean="0"/>
@@ -7797,7 +7840,7 @@
             <a:pPr eaLnBrk="1" hangingPunct="1"/>
             <a:r>
               <a:rPr lang="en-US" altLang="zh-TW" dirty="0" smtClean="0"/>
-              <a:t>3/28:</a:t>
+              <a:t>10/09:</a:t>
             </a:r>
             <a:r>
               <a:rPr lang="zh-TW" altLang="en-US" dirty="0"/>
@@ -7806,22 +7849,6 @@
             <a:r>
               <a:rPr lang="zh-TW" altLang="en-US" dirty="0" smtClean="0"/>
               <a:t>報告</a:t>
-            </a:r>
-            <a:endParaRPr lang="en-US" altLang="zh-TW" dirty="0" smtClean="0"/>
-          </a:p>
-          <a:p>
-            <a:pPr eaLnBrk="1" hangingPunct="1"/>
-            <a:r>
-              <a:rPr lang="en-US" altLang="zh-TW" dirty="0" smtClean="0"/>
-              <a:t>4/04</a:t>
-            </a:r>
-            <a:r>
-              <a:rPr lang="en-US" altLang="zh-TW" dirty="0" smtClean="0"/>
-              <a:t>: </a:t>
-            </a:r>
-            <a:r>
-              <a:rPr lang="zh-TW" altLang="en-US" dirty="0" smtClean="0"/>
-              <a:t>停課</a:t>
             </a:r>
             <a:endParaRPr lang="en-US" altLang="zh-TW" dirty="0" smtClean="0"/>
           </a:p>
@@ -9129,11 +9156,7 @@
             </a:r>
             <a:r>
               <a:rPr lang="en-US" altLang="zh-TW" dirty="0" smtClean="0"/>
-              <a:t>: </a:t>
-            </a:r>
-            <a:r>
-              <a:rPr lang="en-US" altLang="zh-TW" dirty="0" smtClean="0"/>
-              <a:t> iPhone </a:t>
+              <a:t>:  iPhone </a:t>
             </a:r>
             <a:r>
               <a:rPr lang="zh-TW" altLang="en-US" dirty="0" smtClean="0"/>

</xml_diff>

<commit_message>
upload revised slides for 2019-spring semester
</commit_message>
<xml_diff>
--- a/lec01-patent_intro.pptx
+++ b/lec01-patent_intro.pptx
@@ -7817,7 +7817,7 @@
             <a:pPr eaLnBrk="1" hangingPunct="1"/>
             <a:r>
               <a:rPr lang="en-US" altLang="zh-TW" dirty="0" smtClean="0"/>
-              <a:t>9/25: </a:t>
+              <a:t>2/27: </a:t>
             </a:r>
             <a:r>
               <a:rPr lang="zh-TW" altLang="en-US" dirty="0" smtClean="0"/>
@@ -7828,7 +7828,7 @@
             <a:pPr eaLnBrk="1" hangingPunct="1"/>
             <a:r>
               <a:rPr lang="en-US" altLang="zh-TW" dirty="0" smtClean="0"/>
-              <a:t>10/02: </a:t>
+              <a:t>3/6: </a:t>
             </a:r>
             <a:r>
               <a:rPr lang="zh-TW" altLang="en-US" dirty="0" smtClean="0"/>
@@ -7840,7 +7840,7 @@
             <a:pPr eaLnBrk="1" hangingPunct="1"/>
             <a:r>
               <a:rPr lang="en-US" altLang="zh-TW" dirty="0" smtClean="0"/>
-              <a:t>10/09:</a:t>
+              <a:t>3/13:</a:t>
             </a:r>
             <a:r>
               <a:rPr lang="zh-TW" altLang="en-US" dirty="0"/>
@@ -7849,6 +7849,18 @@
             <a:r>
               <a:rPr lang="zh-TW" altLang="en-US" dirty="0" smtClean="0"/>
               <a:t>報告</a:t>
+            </a:r>
+            <a:endParaRPr lang="en-US" altLang="zh-TW" dirty="0" smtClean="0"/>
+          </a:p>
+          <a:p>
+            <a:pPr eaLnBrk="1" hangingPunct="1"/>
+            <a:r>
+              <a:rPr lang="en-US" altLang="zh-TW" dirty="0" smtClean="0"/>
+              <a:t>3/20:</a:t>
+            </a:r>
+            <a:r>
+              <a:rPr lang="zh-TW" altLang="en-US" dirty="0"/>
+              <a:t>專利地圖報告</a:t>
             </a:r>
             <a:endParaRPr lang="en-US" altLang="zh-TW" dirty="0" smtClean="0"/>
           </a:p>

</xml_diff>